<commit_message>
suites > suite ( pdf ppt )
</commit_message>
<xml_diff>
--- a/asset/Learn/ITA-online-install_en.pptx
+++ b/asset/Learn/ITA-online-install_en.pptx
@@ -332,7 +332,7 @@
               <a:rPr kumimoji="1" lang="ja-JP" altLang="en-US" smtClean="0">
                 <a:ea typeface="メイリオ" panose="020B0604030504040204" pitchFamily="50" charset="-128"/>
               </a:rPr>
-              <a:t>2019/7/22</a:t>
+              <a:t>2019/7/30</a:t>
             </a:fld>
             <a:endParaRPr kumimoji="1" lang="ja-JP" altLang="en-US" dirty="0">
               <a:ea typeface="メイリオ" panose="020B0604030504040204" pitchFamily="50" charset="-128"/>
@@ -478,7 +478,7 @@
             <a:fld id="{4B26993D-C081-44EB-B0F5-A9F467792B62}" type="datetimeFigureOut">
               <a:rPr lang="ja-JP" altLang="en-US" smtClean="0"/>
               <a:pPr/>
-              <a:t>2019/7/22</a:t>
+              <a:t>2019/7/30</a:t>
             </a:fld>
             <a:endParaRPr lang="ja-JP" altLang="en-US" dirty="0"/>
           </a:p>
@@ -1101,7 +1101,7 @@
           <a:p>
             <a:fld id="{56F9016B-CCA6-43BE-8BEE-59565A35F4F7}" type="datetimeFigureOut">
               <a:rPr kumimoji="1" lang="ja-JP" altLang="en-US" smtClean="0"/>
-              <a:t>2019/7/22</a:t>
+              <a:t>2019/7/30</a:t>
             </a:fld>
             <a:endParaRPr kumimoji="1" lang="ja-JP" altLang="en-US"/>
           </a:p>
@@ -1303,7 +1303,7 @@
           <a:p>
             <a:fld id="{56F9016B-CCA6-43BE-8BEE-59565A35F4F7}" type="datetimeFigureOut">
               <a:rPr kumimoji="1" lang="ja-JP" altLang="en-US" smtClean="0"/>
-              <a:t>2019/7/22</a:t>
+              <a:t>2019/7/30</a:t>
             </a:fld>
             <a:endParaRPr kumimoji="1" lang="ja-JP" altLang="en-US"/>
           </a:p>
@@ -1549,7 +1549,7 @@
           <a:p>
             <a:fld id="{56F9016B-CCA6-43BE-8BEE-59565A35F4F7}" type="datetimeFigureOut">
               <a:rPr kumimoji="1" lang="ja-JP" altLang="en-US" smtClean="0"/>
-              <a:t>2019/7/22</a:t>
+              <a:t>2019/7/30</a:t>
             </a:fld>
             <a:endParaRPr kumimoji="1" lang="ja-JP" altLang="en-US"/>
           </a:p>
@@ -1845,7 +1845,7 @@
           <a:p>
             <a:fld id="{56F9016B-CCA6-43BE-8BEE-59565A35F4F7}" type="datetimeFigureOut">
               <a:rPr kumimoji="1" lang="ja-JP" altLang="en-US" smtClean="0"/>
-              <a:t>2019/7/22</a:t>
+              <a:t>2019/7/30</a:t>
             </a:fld>
             <a:endParaRPr kumimoji="1" lang="ja-JP" altLang="en-US"/>
           </a:p>
@@ -2276,7 +2276,7 @@
           <a:p>
             <a:fld id="{56F9016B-CCA6-43BE-8BEE-59565A35F4F7}" type="datetimeFigureOut">
               <a:rPr kumimoji="1" lang="ja-JP" altLang="en-US" smtClean="0"/>
-              <a:t>2019/7/22</a:t>
+              <a:t>2019/7/30</a:t>
             </a:fld>
             <a:endParaRPr kumimoji="1" lang="ja-JP" altLang="en-US"/>
           </a:p>
@@ -2394,7 +2394,7 @@
           <a:p>
             <a:fld id="{56F9016B-CCA6-43BE-8BEE-59565A35F4F7}" type="datetimeFigureOut">
               <a:rPr kumimoji="1" lang="ja-JP" altLang="en-US" smtClean="0"/>
-              <a:t>2019/7/22</a:t>
+              <a:t>2019/7/30</a:t>
             </a:fld>
             <a:endParaRPr kumimoji="1" lang="ja-JP" altLang="en-US"/>
           </a:p>
@@ -2489,7 +2489,7 @@
           <a:p>
             <a:fld id="{56F9016B-CCA6-43BE-8BEE-59565A35F4F7}" type="datetimeFigureOut">
               <a:rPr kumimoji="1" lang="ja-JP" altLang="en-US" smtClean="0"/>
-              <a:t>2019/7/22</a:t>
+              <a:t>2019/7/30</a:t>
             </a:fld>
             <a:endParaRPr kumimoji="1" lang="ja-JP" altLang="en-US"/>
           </a:p>
@@ -2798,7 +2798,7 @@
           <a:p>
             <a:fld id="{56F9016B-CCA6-43BE-8BEE-59565A35F4F7}" type="datetimeFigureOut">
               <a:rPr kumimoji="1" lang="ja-JP" altLang="en-US" smtClean="0"/>
-              <a:t>2019/7/22</a:t>
+              <a:t>2019/7/30</a:t>
             </a:fld>
             <a:endParaRPr kumimoji="1" lang="ja-JP" altLang="en-US"/>
           </a:p>
@@ -3051,7 +3051,7 @@
           <a:p>
             <a:fld id="{56F9016B-CCA6-43BE-8BEE-59565A35F4F7}" type="datetimeFigureOut">
               <a:rPr kumimoji="1" lang="ja-JP" altLang="en-US" smtClean="0"/>
-              <a:t>2019/7/22</a:t>
+              <a:t>2019/7/30</a:t>
             </a:fld>
             <a:endParaRPr kumimoji="1" lang="ja-JP" altLang="en-US"/>
           </a:p>
@@ -3328,7 +3328,7 @@
           <a:p>
             <a:fld id="{56F9016B-CCA6-43BE-8BEE-59565A35F4F7}" type="datetimeFigureOut">
               <a:rPr kumimoji="1" lang="ja-JP" altLang="en-US" smtClean="0"/>
-              <a:t>2019/7/22</a:t>
+              <a:t>2019/7/30</a:t>
             </a:fld>
             <a:endParaRPr kumimoji="1" lang="ja-JP" altLang="en-US"/>
           </a:p>
@@ -3540,7 +3540,7 @@
           <a:p>
             <a:fld id="{56F9016B-CCA6-43BE-8BEE-59565A35F4F7}" type="datetimeFigureOut">
               <a:rPr kumimoji="1" lang="ja-JP" altLang="en-US" smtClean="0"/>
-              <a:t>2019/7/22</a:t>
+              <a:t>2019/7/30</a:t>
             </a:fld>
             <a:endParaRPr kumimoji="1" lang="ja-JP" altLang="en-US"/>
           </a:p>
@@ -6599,7 +6599,7 @@
           <a:p>
             <a:fld id="{56F9016B-CCA6-43BE-8BEE-59565A35F4F7}" type="datetimeFigureOut">
               <a:rPr kumimoji="1" lang="ja-JP" altLang="en-US" smtClean="0"/>
-              <a:t>2019/7/22</a:t>
+              <a:t>2019/7/30</a:t>
             </a:fld>
             <a:endParaRPr kumimoji="1" lang="ja-JP" altLang="en-US"/>
           </a:p>
@@ -11283,12 +11283,12 @@
               <a:t>https://</a:t>
             </a:r>
             <a:r>
-              <a:rPr lang="en-US" altLang="ja-JP" sz="1400" dirty="0" smtClean="0">
-                <a:latin typeface="Segoe UI" panose="020B0502040204020203" pitchFamily="34" charset="0"/>
-                <a:ea typeface="Segoe UI" panose="020B0502040204020203" pitchFamily="34" charset="0"/>
-                <a:cs typeface="Segoe UI" panose="020B0502040204020203" pitchFamily="34" charset="0"/>
-              </a:rPr>
-              <a:t>github.com/exastro-series/it-automation/archive/v</a:t>
+              <a:rPr lang="en-US" altLang="ja-JP" sz="1400" dirty="0">
+                <a:latin typeface="Segoe UI" panose="020B0502040204020203" pitchFamily="34" charset="0"/>
+                <a:ea typeface="Segoe UI" panose="020B0502040204020203" pitchFamily="34" charset="0"/>
+                <a:cs typeface="Segoe UI" panose="020B0502040204020203" pitchFamily="34" charset="0"/>
+              </a:rPr>
+              <a:t>github.com/exastro-suite/it-automation/archive/v</a:t>
             </a:r>
             <a:r>
               <a:rPr lang="en-US" altLang="ja-JP" sz="1400" dirty="0" smtClean="0">

</xml_diff>

<commit_message>
Update English Learn documents.
</commit_message>
<xml_diff>
--- a/asset/Learn/ITA-online-install_en.pptx
+++ b/asset/Learn/ITA-online-install_en.pptx
@@ -154,14 +154,14 @@
             <p14:sldId id="509"/>
           </p14:sldIdLst>
         </p14:section>
-        <p14:section name="2.　System Organization" id="{A8A060BF-92DF-4F47-AFEF-F5FA058AAEFB}">
+        <p14:section name="2.　System Configuration" id="{A8A060BF-92DF-4F47-AFEF-F5FA058AAEFB}">
           <p14:sldIdLst>
             <p14:sldId id="510"/>
             <p14:sldId id="511"/>
             <p14:sldId id="512"/>
           </p14:sldIdLst>
         </p14:section>
-        <p14:section name="3.　IT Automation Configuration Procedure" id="{A888FC99-DDF0-485D-AEF5-98295CEB642A}">
+        <p14:section name="3.　IT Automation Construction Procedure" id="{A888FC99-DDF0-485D-AEF5-98295CEB642A}">
           <p14:sldIdLst>
             <p14:sldId id="513"/>
             <p14:sldId id="514"/>
@@ -336,7 +336,7 @@
               <a:rPr kumimoji="1" lang="ja-JP" altLang="en-US" smtClean="0">
                 <a:ea typeface="メイリオ" panose="020B0604030504040204" pitchFamily="50" charset="-128"/>
               </a:rPr>
-              <a:t>2020/7/30</a:t>
+              <a:t>2020/9/3</a:t>
             </a:fld>
             <a:endParaRPr kumimoji="1" lang="ja-JP" altLang="en-US" dirty="0">
               <a:ea typeface="メイリオ" panose="020B0604030504040204" pitchFamily="50" charset="-128"/>
@@ -482,7 +482,7 @@
             <a:fld id="{4B26993D-C081-44EB-B0F5-A9F467792B62}" type="datetimeFigureOut">
               <a:rPr lang="ja-JP" altLang="en-US" smtClean="0"/>
               <a:pPr/>
-              <a:t>2020/7/30</a:t>
+              <a:t>2020/9/3</a:t>
             </a:fld>
             <a:endParaRPr lang="ja-JP" altLang="en-US" dirty="0"/>
           </a:p>
@@ -1105,7 +1105,7 @@
           <a:p>
             <a:fld id="{56F9016B-CCA6-43BE-8BEE-59565A35F4F7}" type="datetimeFigureOut">
               <a:rPr kumimoji="1" lang="ja-JP" altLang="en-US" smtClean="0"/>
-              <a:t>2020/7/30</a:t>
+              <a:t>2020/9/3</a:t>
             </a:fld>
             <a:endParaRPr kumimoji="1" lang="ja-JP" altLang="en-US"/>
           </a:p>
@@ -1307,7 +1307,7 @@
           <a:p>
             <a:fld id="{56F9016B-CCA6-43BE-8BEE-59565A35F4F7}" type="datetimeFigureOut">
               <a:rPr kumimoji="1" lang="ja-JP" altLang="en-US" smtClean="0"/>
-              <a:t>2020/7/30</a:t>
+              <a:t>2020/9/3</a:t>
             </a:fld>
             <a:endParaRPr kumimoji="1" lang="ja-JP" altLang="en-US"/>
           </a:p>
@@ -1553,7 +1553,7 @@
           <a:p>
             <a:fld id="{56F9016B-CCA6-43BE-8BEE-59565A35F4F7}" type="datetimeFigureOut">
               <a:rPr kumimoji="1" lang="ja-JP" altLang="en-US" smtClean="0"/>
-              <a:t>2020/7/30</a:t>
+              <a:t>2020/9/3</a:t>
             </a:fld>
             <a:endParaRPr kumimoji="1" lang="ja-JP" altLang="en-US"/>
           </a:p>
@@ -1849,7 +1849,7 @@
           <a:p>
             <a:fld id="{56F9016B-CCA6-43BE-8BEE-59565A35F4F7}" type="datetimeFigureOut">
               <a:rPr kumimoji="1" lang="ja-JP" altLang="en-US" smtClean="0"/>
-              <a:t>2020/7/30</a:t>
+              <a:t>2020/9/3</a:t>
             </a:fld>
             <a:endParaRPr kumimoji="1" lang="ja-JP" altLang="en-US"/>
           </a:p>
@@ -2280,7 +2280,7 @@
           <a:p>
             <a:fld id="{56F9016B-CCA6-43BE-8BEE-59565A35F4F7}" type="datetimeFigureOut">
               <a:rPr kumimoji="1" lang="ja-JP" altLang="en-US" smtClean="0"/>
-              <a:t>2020/7/30</a:t>
+              <a:t>2020/9/3</a:t>
             </a:fld>
             <a:endParaRPr kumimoji="1" lang="ja-JP" altLang="en-US"/>
           </a:p>
@@ -2398,7 +2398,7 @@
           <a:p>
             <a:fld id="{56F9016B-CCA6-43BE-8BEE-59565A35F4F7}" type="datetimeFigureOut">
               <a:rPr kumimoji="1" lang="ja-JP" altLang="en-US" smtClean="0"/>
-              <a:t>2020/7/30</a:t>
+              <a:t>2020/9/3</a:t>
             </a:fld>
             <a:endParaRPr kumimoji="1" lang="ja-JP" altLang="en-US"/>
           </a:p>
@@ -2493,7 +2493,7 @@
           <a:p>
             <a:fld id="{56F9016B-CCA6-43BE-8BEE-59565A35F4F7}" type="datetimeFigureOut">
               <a:rPr kumimoji="1" lang="ja-JP" altLang="en-US" smtClean="0"/>
-              <a:t>2020/7/30</a:t>
+              <a:t>2020/9/3</a:t>
             </a:fld>
             <a:endParaRPr kumimoji="1" lang="ja-JP" altLang="en-US"/>
           </a:p>
@@ -2802,7 +2802,7 @@
           <a:p>
             <a:fld id="{56F9016B-CCA6-43BE-8BEE-59565A35F4F7}" type="datetimeFigureOut">
               <a:rPr kumimoji="1" lang="ja-JP" altLang="en-US" smtClean="0"/>
-              <a:t>2020/7/30</a:t>
+              <a:t>2020/9/3</a:t>
             </a:fld>
             <a:endParaRPr kumimoji="1" lang="ja-JP" altLang="en-US"/>
           </a:p>
@@ -3055,7 +3055,7 @@
           <a:p>
             <a:fld id="{56F9016B-CCA6-43BE-8BEE-59565A35F4F7}" type="datetimeFigureOut">
               <a:rPr kumimoji="1" lang="ja-JP" altLang="en-US" smtClean="0"/>
-              <a:t>2020/7/30</a:t>
+              <a:t>2020/9/3</a:t>
             </a:fld>
             <a:endParaRPr kumimoji="1" lang="ja-JP" altLang="en-US"/>
           </a:p>
@@ -3332,7 +3332,7 @@
           <a:p>
             <a:fld id="{56F9016B-CCA6-43BE-8BEE-59565A35F4F7}" type="datetimeFigureOut">
               <a:rPr kumimoji="1" lang="ja-JP" altLang="en-US" smtClean="0"/>
-              <a:t>2020/7/30</a:t>
+              <a:t>2020/9/3</a:t>
             </a:fld>
             <a:endParaRPr kumimoji="1" lang="ja-JP" altLang="en-US"/>
           </a:p>
@@ -3544,7 +3544,7 @@
           <a:p>
             <a:fld id="{56F9016B-CCA6-43BE-8BEE-59565A35F4F7}" type="datetimeFigureOut">
               <a:rPr kumimoji="1" lang="ja-JP" altLang="en-US" smtClean="0"/>
-              <a:t>2020/7/30</a:t>
+              <a:t>2020/9/3</a:t>
             </a:fld>
             <a:endParaRPr kumimoji="1" lang="ja-JP" altLang="en-US"/>
           </a:p>
@@ -6603,7 +6603,7 @@
           <a:p>
             <a:fld id="{56F9016B-CCA6-43BE-8BEE-59565A35F4F7}" type="datetimeFigureOut">
               <a:rPr kumimoji="1" lang="ja-JP" altLang="en-US" smtClean="0"/>
-              <a:t>2020/7/30</a:t>
+              <a:t>2020/9/3</a:t>
             </a:fld>
             <a:endParaRPr kumimoji="1" lang="ja-JP" altLang="en-US"/>
           </a:p>
@@ -9325,7 +9325,29 @@
                 <a:ea typeface="Segoe UI" panose="020B0502040204020203" pitchFamily="34" charset="0"/>
                 <a:cs typeface="Segoe UI" panose="020B0502040204020203" pitchFamily="34" charset="0"/>
               </a:rPr>
-              <a:t>IT Automation configuration tools</a:t>
+              <a:t>IT Automation </a:t>
+            </a:r>
+            <a:r>
+              <a:rPr lang="en-US" altLang="ja-JP" dirty="0" smtClean="0">
+                <a:solidFill>
+                  <a:srgbClr val="000000"/>
+                </a:solidFill>
+                <a:latin typeface="Segoe UI" panose="020B0502040204020203" pitchFamily="34" charset="0"/>
+                <a:ea typeface="Segoe UI" panose="020B0502040204020203" pitchFamily="34" charset="0"/>
+                <a:cs typeface="Segoe UI" panose="020B0502040204020203" pitchFamily="34" charset="0"/>
+              </a:rPr>
+              <a:t>construction </a:t>
+            </a:r>
+            <a:r>
+              <a:rPr lang="en-US" altLang="ja-JP" dirty="0" smtClean="0">
+                <a:solidFill>
+                  <a:srgbClr val="000000"/>
+                </a:solidFill>
+                <a:latin typeface="Segoe UI" panose="020B0502040204020203" pitchFamily="34" charset="0"/>
+                <a:ea typeface="Segoe UI" panose="020B0502040204020203" pitchFamily="34" charset="0"/>
+                <a:cs typeface="Segoe UI" panose="020B0502040204020203" pitchFamily="34" charset="0"/>
+              </a:rPr>
+              <a:t>tools</a:t>
             </a:r>
           </a:p>
           <a:p>
@@ -10650,7 +10672,23 @@
                 <a:ea typeface="Segoe UI" panose="020B0502040204020203" pitchFamily="34" charset="0"/>
                 <a:cs typeface="Segoe UI" panose="020B0502040204020203" pitchFamily="34" charset="0"/>
               </a:rPr>
-              <a:t>Flow of IT Automation Configuration</a:t>
+              <a:t>IT </a:t>
+            </a:r>
+            <a:r>
+              <a:rPr lang="en-US" altLang="ja-JP" dirty="0" smtClean="0">
+                <a:latin typeface="Segoe UI" panose="020B0502040204020203" pitchFamily="34" charset="0"/>
+                <a:ea typeface="Segoe UI" panose="020B0502040204020203" pitchFamily="34" charset="0"/>
+                <a:cs typeface="Segoe UI" panose="020B0502040204020203" pitchFamily="34" charset="0"/>
+              </a:rPr>
+              <a:t>Automation </a:t>
+            </a:r>
+            <a:r>
+              <a:rPr lang="en-US" altLang="ja-JP" dirty="0" smtClean="0">
+                <a:latin typeface="Segoe UI" panose="020B0502040204020203" pitchFamily="34" charset="0"/>
+                <a:ea typeface="Segoe UI" panose="020B0502040204020203" pitchFamily="34" charset="0"/>
+                <a:cs typeface="Segoe UI" panose="020B0502040204020203" pitchFamily="34" charset="0"/>
+              </a:rPr>
+              <a:t>Construction flow</a:t>
             </a:r>
             <a:endParaRPr kumimoji="1" lang="ja-JP" altLang="en-US" dirty="0">
               <a:latin typeface="Segoe UI" panose="020B0502040204020203" pitchFamily="34" charset="0"/>
@@ -10683,7 +10721,18 @@
                 <a:ea typeface="Segoe UI" panose="020B0502040204020203" pitchFamily="34" charset="0"/>
                 <a:cs typeface="Segoe UI" panose="020B0502040204020203" pitchFamily="34" charset="0"/>
               </a:rPr>
-              <a:t>Configuration flow </a:t>
+              <a:t>Construction </a:t>
+            </a:r>
+            <a:r>
+              <a:rPr kumimoji="1" lang="en-US" altLang="ja-JP" dirty="0" smtClean="0">
+                <a:solidFill>
+                  <a:srgbClr val="000000"/>
+                </a:solidFill>
+                <a:latin typeface="Segoe UI" panose="020B0502040204020203" pitchFamily="34" charset="0"/>
+                <a:ea typeface="Segoe UI" panose="020B0502040204020203" pitchFamily="34" charset="0"/>
+                <a:cs typeface="Segoe UI" panose="020B0502040204020203" pitchFamily="34" charset="0"/>
+              </a:rPr>
+              <a:t>flow </a:t>
             </a:r>
             <a:r>
               <a:rPr kumimoji="1" lang="en-US" altLang="ja-JP" dirty="0" smtClean="0">
@@ -11123,7 +11172,37 @@
                 <a:ea typeface="Segoe UI" panose="020B0502040204020203" pitchFamily="34" charset="0"/>
                 <a:cs typeface="Segoe UI" panose="020B0502040204020203" pitchFamily="34" charset="0"/>
               </a:rPr>
-              <a:t>Executing the configuration tools </a:t>
+              <a:t>Executing the </a:t>
+            </a:r>
+            <a:r>
+              <a:rPr kumimoji="0" lang="en-US" altLang="ja-JP" sz="1200" strike="noStrike" cap="none" normalizeH="0" baseline="0" dirty="0" smtClean="0">
+                <a:ln>
+                  <a:noFill/>
+                </a:ln>
+                <a:solidFill>
+                  <a:srgbClr val="000000"/>
+                </a:solidFill>
+                <a:effectLst/>
+                <a:latin typeface="Segoe UI" panose="020B0502040204020203" pitchFamily="34" charset="0"/>
+                <a:ea typeface="Segoe UI" panose="020B0502040204020203" pitchFamily="34" charset="0"/>
+                <a:cs typeface="Segoe UI" panose="020B0502040204020203" pitchFamily="34" charset="0"/>
+              </a:rPr>
+              <a:t>construction </a:t>
+            </a:r>
+            <a:r>
+              <a:rPr kumimoji="0" lang="en-US" altLang="ja-JP" sz="1200" strike="noStrike" cap="none" normalizeH="0" baseline="0" dirty="0" smtClean="0">
+                <a:ln>
+                  <a:noFill/>
+                </a:ln>
+                <a:solidFill>
+                  <a:srgbClr val="000000"/>
+                </a:solidFill>
+                <a:effectLst/>
+                <a:latin typeface="Segoe UI" panose="020B0502040204020203" pitchFamily="34" charset="0"/>
+                <a:ea typeface="Segoe UI" panose="020B0502040204020203" pitchFamily="34" charset="0"/>
+                <a:cs typeface="Segoe UI" panose="020B0502040204020203" pitchFamily="34" charset="0"/>
+              </a:rPr>
+              <a:t>tools </a:t>
             </a:r>
           </a:p>
           <a:p>
@@ -11867,7 +11946,15 @@
                 <a:ea typeface="Segoe UI" panose="020B0502040204020203" pitchFamily="34" charset="0"/>
                 <a:cs typeface="Segoe UI" panose="020B0502040204020203" pitchFamily="34" charset="0"/>
               </a:rPr>
-              <a:t>Configuration (1/7)</a:t>
+              <a:t>Construction </a:t>
+            </a:r>
+            <a:r>
+              <a:rPr lang="en-US" altLang="ja-JP" dirty="0" smtClean="0">
+                <a:latin typeface="Segoe UI" panose="020B0502040204020203" pitchFamily="34" charset="0"/>
+                <a:ea typeface="Segoe UI" panose="020B0502040204020203" pitchFamily="34" charset="0"/>
+                <a:cs typeface="Segoe UI" panose="020B0502040204020203" pitchFamily="34" charset="0"/>
+              </a:rPr>
+              <a:t>(1/7)</a:t>
             </a:r>
             <a:endParaRPr kumimoji="1" lang="ja-JP" altLang="en-US" dirty="0">
               <a:latin typeface="Segoe UI" panose="020B0502040204020203" pitchFamily="34" charset="0"/>
@@ -12154,23 +12241,7 @@
                 <a:ea typeface="Segoe UI" panose="020B0502040204020203" pitchFamily="34" charset="0"/>
                 <a:cs typeface="Segoe UI" panose="020B0502040204020203" pitchFamily="34" charset="0"/>
               </a:rPr>
-              <a:t>Deploying the </a:t>
-            </a:r>
-            <a:r>
-              <a:rPr lang="en-US" altLang="ja-JP" dirty="0" smtClean="0">
-                <a:latin typeface="Segoe UI" panose="020B0502040204020203" pitchFamily="34" charset="0"/>
-                <a:ea typeface="Segoe UI" panose="020B0502040204020203" pitchFamily="34" charset="0"/>
-                <a:cs typeface="Segoe UI" panose="020B0502040204020203" pitchFamily="34" charset="0"/>
-              </a:rPr>
-              <a:t>materials</a:t>
-            </a:r>
-            <a:r>
-              <a:rPr lang="en-US" altLang="ja-JP" dirty="0" smtClean="0">
-                <a:latin typeface="Segoe UI" panose="020B0502040204020203" pitchFamily="34" charset="0"/>
-                <a:ea typeface="Segoe UI" panose="020B0502040204020203" pitchFamily="34" charset="0"/>
-                <a:cs typeface="Segoe UI" panose="020B0502040204020203" pitchFamily="34" charset="0"/>
-              </a:rPr>
-              <a:t>.</a:t>
+              <a:t>Deploying the materials.</a:t>
             </a:r>
           </a:p>
           <a:p>
@@ -12484,7 +12555,23 @@
                 <a:ea typeface="Segoe UI" panose="020B0502040204020203" pitchFamily="34" charset="0"/>
                 <a:cs typeface="Segoe UI" panose="020B0502040204020203" pitchFamily="34" charset="0"/>
               </a:rPr>
-              <a:t>3.6	Configuration (2/7)</a:t>
+              <a:t>3.6	</a:t>
+            </a:r>
+            <a:r>
+              <a:rPr lang="en-US" altLang="ja-JP" dirty="0">
+                <a:latin typeface="Segoe UI" panose="020B0502040204020203" pitchFamily="34" charset="0"/>
+                <a:ea typeface="Segoe UI" panose="020B0502040204020203" pitchFamily="34" charset="0"/>
+                <a:cs typeface="Segoe UI" panose="020B0502040204020203" pitchFamily="34" charset="0"/>
+              </a:rPr>
+              <a:t> Construction </a:t>
+            </a:r>
+            <a:r>
+              <a:rPr lang="en-US" altLang="ja-JP" dirty="0" smtClean="0">
+                <a:latin typeface="Segoe UI" panose="020B0502040204020203" pitchFamily="34" charset="0"/>
+                <a:ea typeface="Segoe UI" panose="020B0502040204020203" pitchFamily="34" charset="0"/>
+                <a:cs typeface="Segoe UI" panose="020B0502040204020203" pitchFamily="34" charset="0"/>
+              </a:rPr>
+              <a:t>(2/7)</a:t>
             </a:r>
             <a:endParaRPr kumimoji="1" lang="ja-JP" altLang="en-US" dirty="0">
               <a:latin typeface="Segoe UI" panose="020B0502040204020203" pitchFamily="34" charset="0"/>
@@ -13640,7 +13727,23 @@
                 <a:ea typeface="Segoe UI" panose="020B0502040204020203" pitchFamily="34" charset="0"/>
                 <a:cs typeface="Segoe UI" panose="020B0502040204020203" pitchFamily="34" charset="0"/>
               </a:rPr>
-              <a:t>3.7	Configuration (3/7)</a:t>
+              <a:t>3.7	</a:t>
+            </a:r>
+            <a:r>
+              <a:rPr lang="en-US" altLang="ja-JP" dirty="0">
+                <a:latin typeface="Segoe UI" panose="020B0502040204020203" pitchFamily="34" charset="0"/>
+                <a:ea typeface="Segoe UI" panose="020B0502040204020203" pitchFamily="34" charset="0"/>
+                <a:cs typeface="Segoe UI" panose="020B0502040204020203" pitchFamily="34" charset="0"/>
+              </a:rPr>
+              <a:t> Construction </a:t>
+            </a:r>
+            <a:r>
+              <a:rPr lang="en-US" altLang="ja-JP" dirty="0" smtClean="0">
+                <a:latin typeface="Segoe UI" panose="020B0502040204020203" pitchFamily="34" charset="0"/>
+                <a:ea typeface="Segoe UI" panose="020B0502040204020203" pitchFamily="34" charset="0"/>
+                <a:cs typeface="Segoe UI" panose="020B0502040204020203" pitchFamily="34" charset="0"/>
+              </a:rPr>
+              <a:t>(3/7)</a:t>
             </a:r>
             <a:endParaRPr kumimoji="1" lang="ja-JP" altLang="en-US" dirty="0">
               <a:latin typeface="Segoe UI" panose="020B0502040204020203" pitchFamily="34" charset="0"/>
@@ -15246,22 +15349,19 @@
           <a:p>
             <a:pPr algn="ctr"/>
             <a:r>
-              <a:rPr lang="en-US" altLang="ja-JP" sz="1200" b="1" dirty="0" smtClean="0">
+              <a:rPr lang="en-US" altLang="ja-JP" sz="1200" b="1" dirty="0">
                 <a:solidFill>
                   <a:srgbClr val="FF0000"/>
                 </a:solidFill>
-                <a:latin typeface="Segoe UI" panose="020B0502040204020203" pitchFamily="34" charset="0"/>
-                <a:ea typeface="Segoe UI" panose="020B0502040204020203" pitchFamily="34" charset="0"/>
-                <a:cs typeface="Segoe UI" panose="020B0502040204020203" pitchFamily="34" charset="0"/>
-              </a:rPr>
-              <a:t>Enter values for these items only if you use RHEL.</a:t>
-            </a:r>
-            <a:endParaRPr kumimoji="1" lang="ja-JP" altLang="en-US" sz="1400" b="1" dirty="0" smtClean="0">
+                <a:latin typeface="+mn-ea"/>
+              </a:rPr>
+              <a:t>Required if OS is RHEL</a:t>
+            </a:r>
+            <a:endParaRPr lang="ja-JP" altLang="en-US" sz="1400" b="1" dirty="0">
               <a:solidFill>
                 <a:srgbClr val="FF0000"/>
               </a:solidFill>
-              <a:latin typeface="Segoe UI" panose="020B0502040204020203" pitchFamily="34" charset="0"/>
-              <a:cs typeface="Segoe UI" panose="020B0502040204020203" pitchFamily="34" charset="0"/>
+              <a:latin typeface="+mn-ea"/>
             </a:endParaRPr>
           </a:p>
         </p:txBody>
@@ -15811,12 +15911,20 @@
               <a:t>	</a:t>
             </a:r>
             <a:r>
+              <a:rPr lang="en-US" altLang="ja-JP" dirty="0">
+                <a:latin typeface="Segoe UI" panose="020B0502040204020203" pitchFamily="34" charset="0"/>
+                <a:ea typeface="Segoe UI" panose="020B0502040204020203" pitchFamily="34" charset="0"/>
+                <a:cs typeface="Segoe UI" panose="020B0502040204020203" pitchFamily="34" charset="0"/>
+              </a:rPr>
+              <a:t> Construction </a:t>
+            </a:r>
+            <a:r>
               <a:rPr lang="en-US" altLang="ja-JP" dirty="0" smtClean="0">
                 <a:latin typeface="Segoe UI" panose="020B0502040204020203" pitchFamily="34" charset="0"/>
                 <a:ea typeface="Segoe UI" panose="020B0502040204020203" pitchFamily="34" charset="0"/>
                 <a:cs typeface="Segoe UI" panose="020B0502040204020203" pitchFamily="34" charset="0"/>
               </a:rPr>
-              <a:t>Configuration (4/7)</a:t>
+              <a:t>(4/7)</a:t>
             </a:r>
             <a:endParaRPr kumimoji="1" lang="ja-JP" altLang="en-US" dirty="0">
               <a:latin typeface="Segoe UI" panose="020B0502040204020203" pitchFamily="34" charset="0"/>
@@ -19182,7 +19290,15 @@
                 <a:ea typeface="Segoe UI" panose="020B0502040204020203" pitchFamily="34" charset="0"/>
                 <a:cs typeface="Segoe UI" panose="020B0502040204020203" pitchFamily="34" charset="0"/>
               </a:rPr>
-              <a:t>Configuration (5/7)</a:t>
+              <a:t>Construction </a:t>
+            </a:r>
+            <a:r>
+              <a:rPr lang="en-US" altLang="ja-JP" dirty="0" smtClean="0">
+                <a:latin typeface="Segoe UI" panose="020B0502040204020203" pitchFamily="34" charset="0"/>
+                <a:ea typeface="Segoe UI" panose="020B0502040204020203" pitchFamily="34" charset="0"/>
+                <a:cs typeface="Segoe UI" panose="020B0502040204020203" pitchFamily="34" charset="0"/>
+              </a:rPr>
+              <a:t>(5/7)</a:t>
             </a:r>
             <a:endParaRPr kumimoji="1" lang="ja-JP" altLang="en-US" dirty="0">
               <a:latin typeface="Segoe UI" panose="020B0502040204020203" pitchFamily="34" charset="0"/>
@@ -20759,15 +20875,13 @@
           <a:p>
             <a:pPr algn="ctr"/>
             <a:r>
-              <a:rPr lang="ja-JP" altLang="en-US" sz="1100" b="1" dirty="0">
+              <a:rPr lang="en-US" altLang="ja-JP" sz="1100" b="1" dirty="0">
                 <a:solidFill>
                   <a:srgbClr val="FF0000"/>
                 </a:solidFill>
-                <a:latin typeface="Segoe UI" panose="020B0502040204020203" pitchFamily="34" charset="0"/>
-                <a:ea typeface="Segoe UI" panose="020B0502040204020203" pitchFamily="34" charset="0"/>
-                <a:cs typeface="Segoe UI" panose="020B0502040204020203" pitchFamily="34" charset="0"/>
-              </a:rPr>
-              <a:t>＊</a:t>
+                <a:latin typeface="+mn-ea"/>
+              </a:rPr>
+              <a:t>※</a:t>
             </a:r>
             <a:r>
               <a:rPr lang="ja-JP" altLang="en-US" sz="1100" b="1" dirty="0" smtClean="0">
@@ -21446,7 +21560,11 @@
             </a:r>
             <a:r>
               <a:rPr lang="en-US" altLang="ja-JP" dirty="0" smtClean="0"/>
-              <a:t>Configuration (6/7)</a:t>
+              <a:t>Construction </a:t>
+            </a:r>
+            <a:r>
+              <a:rPr lang="en-US" altLang="ja-JP" dirty="0" smtClean="0"/>
+              <a:t>(6/7)</a:t>
             </a:r>
             <a:endParaRPr kumimoji="1" lang="ja-JP" altLang="en-US" dirty="0"/>
           </a:p>
@@ -21562,31 +21680,23 @@
           <a:p>
             <a:pPr lvl="1"/>
             <a:r>
-              <a:rPr lang="en-US" altLang="ja-JP" dirty="0" smtClean="0"/>
-              <a:t>Executing the </a:t>
-            </a:r>
-            <a:r>
-              <a:rPr lang="en-US" altLang="ja-JP" dirty="0" smtClean="0">
-                <a:solidFill>
-                  <a:srgbClr val="000000"/>
-                </a:solidFill>
-              </a:rPr>
-              <a:t>configuration tool outputs the process details to </a:t>
-            </a:r>
-            <a:r>
-              <a:rPr lang="en-US" altLang="ja-JP" kern="100" dirty="0" smtClean="0"/>
+              <a:rPr lang="en-US" altLang="ja-JP" dirty="0"/>
+              <a:t>The content of process executed by construction tool is output to </a:t>
+            </a:r>
+            <a:r>
+              <a:rPr lang="en-US" altLang="ja-JP" kern="100" dirty="0"/>
               <a:t>ita</a:t>
             </a:r>
             <a:r>
-              <a:rPr lang="en-US" altLang="ja-JP" dirty="0" smtClean="0"/>
-              <a:t>_builder.log and ita_installer.log.</a:t>
+              <a:rPr lang="en-US" altLang="ja-JP" dirty="0"/>
+              <a:t>_builder.log and ita_installer.log</a:t>
             </a:r>
           </a:p>
           <a:p>
             <a:pPr lvl="1"/>
             <a:r>
-              <a:rPr lang="en-US" altLang="ja-JP" dirty="0" smtClean="0"/>
-              <a:t>Path to the logs</a:t>
+              <a:rPr lang="en-US" altLang="ja-JP" dirty="0"/>
+              <a:t>Log storage path</a:t>
             </a:r>
           </a:p>
           <a:p>
@@ -21602,10 +21712,8 @@
               <a:t>/(</a:t>
             </a:r>
             <a:r>
-              <a:rPr lang="en-US" altLang="ja-JP" sz="1400" kern="100" dirty="0">
-                <a:ea typeface="Segoe UI" panose="020B0502040204020203" pitchFamily="34" charset="0"/>
-              </a:rPr>
-              <a:t>Extract path</a:t>
+              <a:rPr lang="en-US" altLang="ja-JP" sz="1400" kern="100" dirty="0"/>
+              <a:t>Installation file extract path</a:t>
             </a:r>
             <a:r>
               <a:rPr lang="en-US" altLang="ja-JP" sz="1400" dirty="0" smtClean="0"/>
@@ -21716,7 +21824,15 @@
                 <a:ea typeface="Segoe UI" panose="020B0502040204020203" pitchFamily="34" charset="0"/>
                 <a:cs typeface="Segoe UI" panose="020B0502040204020203" pitchFamily="34" charset="0"/>
               </a:rPr>
-              <a:t>Configuration (7/7)</a:t>
+              <a:t>Construction </a:t>
+            </a:r>
+            <a:r>
+              <a:rPr lang="en-US" altLang="ja-JP" dirty="0" smtClean="0">
+                <a:latin typeface="Segoe UI" panose="020B0502040204020203" pitchFamily="34" charset="0"/>
+                <a:ea typeface="Segoe UI" panose="020B0502040204020203" pitchFamily="34" charset="0"/>
+                <a:cs typeface="Segoe UI" panose="020B0502040204020203" pitchFamily="34" charset="0"/>
+              </a:rPr>
+              <a:t>(7/7)</a:t>
             </a:r>
             <a:endParaRPr kumimoji="1" lang="ja-JP" altLang="en-US" dirty="0">
               <a:latin typeface="Segoe UI" panose="020B0502040204020203" pitchFamily="34" charset="0"/>
@@ -21748,26 +21864,27 @@
           <a:lstStyle/>
           <a:p>
             <a:r>
+              <a:rPr lang="en-US" altLang="ja-JP" dirty="0"/>
+              <a:t>List of libraries installed during construction.</a:t>
+            </a:r>
+          </a:p>
+          <a:p>
+            <a:pPr lvl="1"/>
+            <a:r>
               <a:rPr lang="en-US" altLang="ja-JP" dirty="0" smtClean="0">
-                <a:solidFill>
-                  <a:srgbClr val="000000"/>
-                </a:solidFill>
-                <a:latin typeface="Segoe UI" panose="020B0502040204020203" pitchFamily="34" charset="0"/>
-                <a:ea typeface="Segoe UI" panose="020B0502040204020203" pitchFamily="34" charset="0"/>
-                <a:cs typeface="Segoe UI" panose="020B0502040204020203" pitchFamily="34" charset="0"/>
-              </a:rPr>
-              <a:t>Libraries installed through the configuration</a:t>
-            </a:r>
-          </a:p>
-          <a:p>
-            <a:pPr lvl="1"/>
+                <a:latin typeface="Segoe UI" panose="020B0502040204020203" pitchFamily="34" charset="0"/>
+                <a:ea typeface="Segoe UI" panose="020B0502040204020203" pitchFamily="34" charset="0"/>
+                <a:cs typeface="Segoe UI" panose="020B0502040204020203" pitchFamily="34" charset="0"/>
+              </a:rPr>
+              <a:t>The </a:t>
+            </a:r>
             <a:r>
               <a:rPr lang="en-US" altLang="ja-JP" dirty="0" smtClean="0">
                 <a:latin typeface="Segoe UI" panose="020B0502040204020203" pitchFamily="34" charset="0"/>
                 <a:ea typeface="Segoe UI" panose="020B0502040204020203" pitchFamily="34" charset="0"/>
                 <a:cs typeface="Segoe UI" panose="020B0502040204020203" pitchFamily="34" charset="0"/>
               </a:rPr>
-              <a:t>The following table lists the libraries installed through the execution of the </a:t>
+              <a:t>following table lists the libraries installed through the execution of the </a:t>
             </a:r>
             <a:r>
               <a:rPr lang="en-US" altLang="ja-JP" dirty="0" smtClean="0">
@@ -23667,8 +23784,21 @@
                 <a:ea typeface="Segoe UI" panose="020B0502040204020203" pitchFamily="34" charset="0"/>
                 <a:cs typeface="Segoe UI" panose="020B0502040204020203" pitchFamily="34" charset="0"/>
               </a:rPr>
-              <a:t>System Organization</a:t>
-            </a:r>
+              <a:t>System </a:t>
+            </a:r>
+            <a:r>
+              <a:rPr lang="en-US" altLang="ja-JP" sz="1400" dirty="0" smtClean="0">
+                <a:latin typeface="Segoe UI" panose="020B0502040204020203" pitchFamily="34" charset="0"/>
+                <a:ea typeface="Segoe UI" panose="020B0502040204020203" pitchFamily="34" charset="0"/>
+                <a:cs typeface="Segoe UI" panose="020B0502040204020203" pitchFamily="34" charset="0"/>
+              </a:rPr>
+              <a:t>Configuration</a:t>
+            </a:r>
+            <a:endParaRPr lang="en-US" altLang="ja-JP" sz="1400" dirty="0">
+              <a:latin typeface="Segoe UI" panose="020B0502040204020203" pitchFamily="34" charset="0"/>
+              <a:ea typeface="Segoe UI" panose="020B0502040204020203" pitchFamily="34" charset="0"/>
+              <a:cs typeface="Segoe UI" panose="020B0502040204020203" pitchFamily="34" charset="0"/>
+            </a:endParaRPr>
           </a:p>
           <a:p>
             <a:r>
@@ -23687,12 +23817,14 @@
               <a:t> 2.1	</a:t>
             </a:r>
             <a:r>
-              <a:rPr lang="en-US" altLang="zh-TW" sz="1400" dirty="0">
-                <a:ea typeface="Segoe UI" panose="020B0502040204020203" pitchFamily="34" charset="0"/>
-              </a:rPr>
-              <a:t>Functions executed in conjunction with other tools</a:t>
-            </a:r>
-            <a:endParaRPr lang="en-US" altLang="zh-TW" sz="1400" dirty="0">
+              <a:rPr lang="en-US" altLang="zh-TW" sz="1400" dirty="0" smtClean="0"/>
+              <a:t>Associated </a:t>
+            </a:r>
+            <a:r>
+              <a:rPr lang="en-US" altLang="zh-TW" sz="1400" dirty="0"/>
+              <a:t>execution function</a:t>
+            </a:r>
+            <a:endParaRPr lang="en-US" altLang="zh-TW" sz="1400" dirty="0" smtClean="0">
               <a:solidFill>
                 <a:srgbClr val="000000"/>
               </a:solidFill>
@@ -23703,14 +23835,14 @@
           </a:p>
           <a:p>
             <a:r>
-              <a:rPr lang="ja-JP" altLang="en-US" sz="1400" dirty="0">
+              <a:rPr lang="ja-JP" altLang="en-US" sz="1400" dirty="0" smtClean="0">
                 <a:latin typeface="Segoe UI" panose="020B0502040204020203" pitchFamily="34" charset="0"/>
                 <a:cs typeface="Segoe UI" panose="020B0502040204020203" pitchFamily="34" charset="0"/>
               </a:rPr>
               <a:t>　 </a:t>
             </a:r>
             <a:r>
-              <a:rPr lang="en-US" altLang="ja-JP" sz="1400" dirty="0">
+              <a:rPr lang="en-US" altLang="ja-JP" sz="1400" dirty="0" smtClean="0">
                 <a:latin typeface="Segoe UI" panose="020B0502040204020203" pitchFamily="34" charset="0"/>
                 <a:ea typeface="Segoe UI" panose="020B0502040204020203" pitchFamily="34" charset="0"/>
                 <a:cs typeface="Segoe UI" panose="020B0502040204020203" pitchFamily="34" charset="0"/>
@@ -23718,7 +23850,7 @@
               <a:t>2.2	</a:t>
             </a:r>
             <a:r>
-              <a:rPr lang="en-US" altLang="ja-JP" sz="1400" dirty="0">
+              <a:rPr lang="en-US" altLang="ja-JP" sz="1400" dirty="0" smtClean="0">
                 <a:solidFill>
                   <a:srgbClr val="000000"/>
                 </a:solidFill>
@@ -23871,7 +24003,7 @@
               <a:t>    3.4	</a:t>
             </a:r>
             <a:r>
-              <a:rPr lang="en-US" altLang="ja-JP" sz="1400" dirty="0">
+              <a:rPr lang="en-US" altLang="ja-JP" sz="1400" dirty="0" smtClean="0">
                 <a:solidFill>
                   <a:srgbClr val="000000"/>
                 </a:solidFill>
@@ -23879,7 +24011,7 @@
                 <a:ea typeface="Segoe UI" panose="020B0502040204020203" pitchFamily="34" charset="0"/>
                 <a:cs typeface="Segoe UI" panose="020B0502040204020203" pitchFamily="34" charset="0"/>
               </a:rPr>
-              <a:t>Flow of </a:t>
+              <a:t>IT </a:t>
             </a:r>
             <a:r>
               <a:rPr lang="en-US" altLang="ja-JP" sz="1400" dirty="0" smtClean="0">
@@ -23890,10 +24022,10 @@
                 <a:ea typeface="Segoe UI" panose="020B0502040204020203" pitchFamily="34" charset="0"/>
                 <a:cs typeface="Segoe UI" panose="020B0502040204020203" pitchFamily="34" charset="0"/>
               </a:rPr>
-              <a:t>IT Automation </a:t>
-            </a:r>
-            <a:r>
-              <a:rPr lang="en-US" altLang="ja-JP" sz="1400" dirty="0">
+              <a:t>Automation </a:t>
+            </a:r>
+            <a:r>
+              <a:rPr lang="en-US" altLang="ja-JP" sz="1400" dirty="0" smtClean="0">
                 <a:solidFill>
                   <a:srgbClr val="000000"/>
                 </a:solidFill>
@@ -23901,7 +24033,7 @@
                 <a:ea typeface="Segoe UI" panose="020B0502040204020203" pitchFamily="34" charset="0"/>
                 <a:cs typeface="Segoe UI" panose="020B0502040204020203" pitchFamily="34" charset="0"/>
               </a:rPr>
-              <a:t>Configuration</a:t>
+              <a:t>Construction flow</a:t>
             </a:r>
             <a:endParaRPr lang="ja-JP" altLang="en-US" sz="1400" dirty="0">
               <a:solidFill>
@@ -23921,6 +24053,17 @@
               <a:t>    3.5	</a:t>
             </a:r>
             <a:r>
+              <a:rPr lang="en-US" altLang="ja-JP" sz="1400" dirty="0" smtClean="0">
+                <a:solidFill>
+                  <a:srgbClr val="000000"/>
+                </a:solidFill>
+                <a:latin typeface="Segoe UI" panose="020B0502040204020203" pitchFamily="34" charset="0"/>
+                <a:ea typeface="Segoe UI" panose="020B0502040204020203" pitchFamily="34" charset="0"/>
+                <a:cs typeface="Segoe UI" panose="020B0502040204020203" pitchFamily="34" charset="0"/>
+              </a:rPr>
+              <a:t>Construction </a:t>
+            </a:r>
+            <a:r>
               <a:rPr lang="en-US" altLang="ja-JP" sz="1400" dirty="0">
                 <a:solidFill>
                   <a:srgbClr val="000000"/>
@@ -23929,7 +24072,7 @@
                 <a:ea typeface="Segoe UI" panose="020B0502040204020203" pitchFamily="34" charset="0"/>
                 <a:cs typeface="Segoe UI" panose="020B0502040204020203" pitchFamily="34" charset="0"/>
               </a:rPr>
-              <a:t>Configuration (1/7)</a:t>
+              <a:t>(1/7)</a:t>
             </a:r>
             <a:endParaRPr lang="ja-JP" altLang="en-US" sz="1400" dirty="0">
               <a:solidFill>
@@ -23949,6 +24092,17 @@
               <a:t>    3.6	</a:t>
             </a:r>
             <a:r>
+              <a:rPr lang="en-US" altLang="ja-JP" sz="1400" dirty="0" smtClean="0">
+                <a:solidFill>
+                  <a:srgbClr val="000000"/>
+                </a:solidFill>
+                <a:latin typeface="Segoe UI" panose="020B0502040204020203" pitchFamily="34" charset="0"/>
+                <a:ea typeface="Segoe UI" panose="020B0502040204020203" pitchFamily="34" charset="0"/>
+                <a:cs typeface="Segoe UI" panose="020B0502040204020203" pitchFamily="34" charset="0"/>
+              </a:rPr>
+              <a:t>Construction </a:t>
+            </a:r>
+            <a:r>
               <a:rPr lang="en-US" altLang="ja-JP" sz="1400" dirty="0">
                 <a:solidFill>
                   <a:srgbClr val="000000"/>
@@ -23957,7 +24111,7 @@
                 <a:ea typeface="Segoe UI" panose="020B0502040204020203" pitchFamily="34" charset="0"/>
                 <a:cs typeface="Segoe UI" panose="020B0502040204020203" pitchFamily="34" charset="0"/>
               </a:rPr>
-              <a:t>Configuration (2/7)</a:t>
+              <a:t>(2/7)</a:t>
             </a:r>
             <a:endParaRPr lang="ja-JP" altLang="en-US" sz="1400" dirty="0">
               <a:solidFill>
@@ -23977,6 +24131,17 @@
               <a:t>    3.7	</a:t>
             </a:r>
             <a:r>
+              <a:rPr lang="en-US" altLang="ja-JP" sz="1400" dirty="0" smtClean="0">
+                <a:solidFill>
+                  <a:srgbClr val="000000"/>
+                </a:solidFill>
+                <a:latin typeface="Segoe UI" panose="020B0502040204020203" pitchFamily="34" charset="0"/>
+                <a:ea typeface="Segoe UI" panose="020B0502040204020203" pitchFamily="34" charset="0"/>
+                <a:cs typeface="Segoe UI" panose="020B0502040204020203" pitchFamily="34" charset="0"/>
+              </a:rPr>
+              <a:t>Construction </a:t>
+            </a:r>
+            <a:r>
               <a:rPr lang="en-US" altLang="ja-JP" sz="1400" dirty="0">
                 <a:solidFill>
                   <a:srgbClr val="000000"/>
@@ -23985,7 +24150,7 @@
                 <a:ea typeface="Segoe UI" panose="020B0502040204020203" pitchFamily="34" charset="0"/>
                 <a:cs typeface="Segoe UI" panose="020B0502040204020203" pitchFamily="34" charset="0"/>
               </a:rPr>
-              <a:t>Configuration (3/7)</a:t>
+              <a:t>(3/7)</a:t>
             </a:r>
             <a:endParaRPr lang="ja-JP" altLang="en-US" sz="1400" dirty="0">
               <a:solidFill>
@@ -24005,6 +24170,17 @@
               <a:t>    3.8	</a:t>
             </a:r>
             <a:r>
+              <a:rPr lang="en-US" altLang="ja-JP" sz="1400" dirty="0" smtClean="0">
+                <a:solidFill>
+                  <a:srgbClr val="000000"/>
+                </a:solidFill>
+                <a:latin typeface="Segoe UI" panose="020B0502040204020203" pitchFamily="34" charset="0"/>
+                <a:ea typeface="Segoe UI" panose="020B0502040204020203" pitchFamily="34" charset="0"/>
+                <a:cs typeface="Segoe UI" panose="020B0502040204020203" pitchFamily="34" charset="0"/>
+              </a:rPr>
+              <a:t>Construction </a:t>
+            </a:r>
+            <a:r>
               <a:rPr lang="en-US" altLang="ja-JP" sz="1400" dirty="0">
                 <a:solidFill>
                   <a:srgbClr val="000000"/>
@@ -24013,7 +24189,7 @@
                 <a:ea typeface="Segoe UI" panose="020B0502040204020203" pitchFamily="34" charset="0"/>
                 <a:cs typeface="Segoe UI" panose="020B0502040204020203" pitchFamily="34" charset="0"/>
               </a:rPr>
-              <a:t>Configuration (4/7)</a:t>
+              <a:t>(4/7)</a:t>
             </a:r>
             <a:endParaRPr lang="ja-JP" altLang="en-US" sz="1400" dirty="0">
               <a:solidFill>
@@ -24033,6 +24209,17 @@
               <a:t>    3.9	</a:t>
             </a:r>
             <a:r>
+              <a:rPr lang="en-US" altLang="ja-JP" sz="1400" dirty="0" smtClean="0">
+                <a:solidFill>
+                  <a:srgbClr val="000000"/>
+                </a:solidFill>
+                <a:latin typeface="Segoe UI" panose="020B0502040204020203" pitchFamily="34" charset="0"/>
+                <a:ea typeface="Segoe UI" panose="020B0502040204020203" pitchFamily="34" charset="0"/>
+                <a:cs typeface="Segoe UI" panose="020B0502040204020203" pitchFamily="34" charset="0"/>
+              </a:rPr>
+              <a:t>Construction </a:t>
+            </a:r>
+            <a:r>
               <a:rPr lang="en-US" altLang="ja-JP" sz="1400" dirty="0">
                 <a:solidFill>
                   <a:srgbClr val="000000"/>
@@ -24041,7 +24228,7 @@
                 <a:ea typeface="Segoe UI" panose="020B0502040204020203" pitchFamily="34" charset="0"/>
                 <a:cs typeface="Segoe UI" panose="020B0502040204020203" pitchFamily="34" charset="0"/>
               </a:rPr>
-              <a:t>Configuration (5/7)</a:t>
+              <a:t>(5/7)</a:t>
             </a:r>
             <a:endParaRPr lang="ja-JP" altLang="en-US" sz="1400" dirty="0">
               <a:solidFill>
@@ -24061,6 +24248,17 @@
               <a:t>    3.10	</a:t>
             </a:r>
             <a:r>
+              <a:rPr lang="en-US" altLang="ja-JP" sz="1400" dirty="0" smtClean="0">
+                <a:solidFill>
+                  <a:srgbClr val="000000"/>
+                </a:solidFill>
+                <a:latin typeface="Segoe UI" panose="020B0502040204020203" pitchFamily="34" charset="0"/>
+                <a:ea typeface="Segoe UI" panose="020B0502040204020203" pitchFamily="34" charset="0"/>
+                <a:cs typeface="Segoe UI" panose="020B0502040204020203" pitchFamily="34" charset="0"/>
+              </a:rPr>
+              <a:t>Construction </a:t>
+            </a:r>
+            <a:r>
               <a:rPr lang="en-US" altLang="ja-JP" sz="1400" dirty="0">
                 <a:solidFill>
                   <a:srgbClr val="000000"/>
@@ -24069,7 +24267,7 @@
                 <a:ea typeface="Segoe UI" panose="020B0502040204020203" pitchFamily="34" charset="0"/>
                 <a:cs typeface="Segoe UI" panose="020B0502040204020203" pitchFamily="34" charset="0"/>
               </a:rPr>
-              <a:t>Configuration (6/7)</a:t>
+              <a:t>(6/7)</a:t>
             </a:r>
             <a:endParaRPr lang="ja-JP" altLang="en-US" sz="1400" dirty="0">
               <a:solidFill>
@@ -24089,6 +24287,17 @@
               <a:t>    3.11	</a:t>
             </a:r>
             <a:r>
+              <a:rPr lang="en-US" altLang="ja-JP" sz="1400" dirty="0" smtClean="0">
+                <a:solidFill>
+                  <a:srgbClr val="000000"/>
+                </a:solidFill>
+                <a:latin typeface="Segoe UI" panose="020B0502040204020203" pitchFamily="34" charset="0"/>
+                <a:ea typeface="Segoe UI" panose="020B0502040204020203" pitchFamily="34" charset="0"/>
+                <a:cs typeface="Segoe UI" panose="020B0502040204020203" pitchFamily="34" charset="0"/>
+              </a:rPr>
+              <a:t>Construction </a:t>
+            </a:r>
+            <a:r>
               <a:rPr lang="en-US" altLang="ja-JP" sz="1400" dirty="0">
                 <a:solidFill>
                   <a:srgbClr val="000000"/>
@@ -24097,7 +24306,7 @@
                 <a:ea typeface="Segoe UI" panose="020B0502040204020203" pitchFamily="34" charset="0"/>
                 <a:cs typeface="Segoe UI" panose="020B0502040204020203" pitchFamily="34" charset="0"/>
               </a:rPr>
-              <a:t>Configuration (7/7)</a:t>
+              <a:t>(7/7)</a:t>
             </a:r>
           </a:p>
           <a:p>
@@ -24613,7 +24822,7 @@
                 <a:ea typeface="Segoe UI" panose="020B0502040204020203" pitchFamily="34" charset="0"/>
                 <a:cs typeface="Segoe UI" panose="020B0502040204020203" pitchFamily="34" charset="0"/>
               </a:rPr>
-              <a:t>address)</a:t>
+              <a:t>address of server)</a:t>
             </a:r>
             <a:r>
               <a:rPr lang="en-US" altLang="ja-JP" dirty="0">
@@ -24741,7 +24950,7 @@
                 <a:ea typeface="Segoe UI" panose="020B0502040204020203" pitchFamily="34" charset="0"/>
                 <a:cs typeface="Segoe UI" panose="020B0502040204020203" pitchFamily="34" charset="0"/>
               </a:rPr>
-              <a:t>When the IT Automation login screen appears, enter the given login ID and initial password and then click the </a:t>
+              <a:t>When the IT Automation login screen is displayed, enter the given login ID and initial password and then click the </a:t>
             </a:r>
             <a:r>
               <a:rPr lang="en-US" altLang="ja-JP" b="1" dirty="0">
@@ -24765,76 +24974,57 @@
             </a:endParaRPr>
           </a:p>
           <a:p>
-            <a:pPr marL="288000" lvl="2" indent="0">
+            <a:pPr marL="180000" lvl="1" indent="0">
               <a:buNone/>
             </a:pPr>
             <a:r>
-              <a:rPr lang="en-US" altLang="ja-JP" dirty="0">
-                <a:latin typeface="Segoe UI" panose="020B0502040204020203" pitchFamily="34" charset="0"/>
-                <a:ea typeface="Segoe UI" panose="020B0502040204020203" pitchFamily="34" charset="0"/>
-                <a:cs typeface="Segoe UI" panose="020B0502040204020203" pitchFamily="34" charset="0"/>
-              </a:rPr>
-              <a:t>     	- Login ID:</a:t>
-            </a:r>
-            <a:r>
-              <a:rPr lang="ja-JP" altLang="en-US" dirty="0">
-                <a:latin typeface="Segoe UI" panose="020B0502040204020203" pitchFamily="34" charset="0"/>
-                <a:ea typeface="Segoe UI" panose="020B0502040204020203" pitchFamily="34" charset="0"/>
-                <a:cs typeface="Segoe UI" panose="020B0502040204020203" pitchFamily="34" charset="0"/>
-              </a:rPr>
+              <a:rPr lang="ja-JP" altLang="ja-JP" dirty="0"/>
+              <a:t>　　・</a:t>
+            </a:r>
+            <a:r>
+              <a:rPr lang="en-US" altLang="ja-JP" dirty="0"/>
+              <a:t>Login ID</a:t>
+            </a:r>
+            <a:r>
+              <a:rPr lang="ja-JP" altLang="ja-JP" dirty="0"/>
+              <a:t>　　</a:t>
+            </a:r>
+            <a:r>
+              <a:rPr lang="en-US" altLang="ja-JP" dirty="0"/>
+              <a:t>      </a:t>
+            </a:r>
+            <a:r>
+              <a:rPr lang="ja-JP" altLang="ja-JP" dirty="0"/>
+              <a:t>：</a:t>
+            </a:r>
+            <a:r>
+              <a:rPr lang="ja-JP" altLang="en-US" dirty="0"/>
               <a:t> </a:t>
             </a:r>
             <a:r>
-              <a:rPr lang="en-US" altLang="ja-JP" dirty="0">
-                <a:latin typeface="Segoe UI" panose="020B0502040204020203" pitchFamily="34" charset="0"/>
-                <a:ea typeface="Segoe UI" panose="020B0502040204020203" pitchFamily="34" charset="0"/>
-                <a:cs typeface="Segoe UI" panose="020B0502040204020203" pitchFamily="34" charset="0"/>
-              </a:rPr>
+              <a:rPr lang="en-US" altLang="ja-JP" dirty="0"/>
               <a:t>administrator</a:t>
             </a:r>
-            <a:endParaRPr lang="ja-JP" altLang="ja-JP" dirty="0">
-              <a:latin typeface="Segoe UI" panose="020B0502040204020203" pitchFamily="34" charset="0"/>
-              <a:cs typeface="Segoe UI" panose="020B0502040204020203" pitchFamily="34" charset="0"/>
-            </a:endParaRPr>
-          </a:p>
-          <a:p>
-            <a:pPr marL="288000" lvl="2" indent="0">
+            <a:endParaRPr lang="ja-JP" altLang="ja-JP" dirty="0"/>
+          </a:p>
+          <a:p>
+            <a:pPr marL="180000" lvl="1" indent="0">
               <a:buNone/>
             </a:pPr>
             <a:r>
-              <a:rPr lang="en-US" altLang="ja-JP" dirty="0">
-                <a:latin typeface="Segoe UI" panose="020B0502040204020203" pitchFamily="34" charset="0"/>
-                <a:ea typeface="Segoe UI" panose="020B0502040204020203" pitchFamily="34" charset="0"/>
-                <a:cs typeface="Segoe UI" panose="020B0502040204020203" pitchFamily="34" charset="0"/>
-              </a:rPr>
-              <a:t>     	- </a:t>
-            </a:r>
-            <a:r>
-              <a:rPr lang="en-US" altLang="ja-JP" dirty="0">
-                <a:solidFill>
-                  <a:srgbClr val="000000"/>
-                </a:solidFill>
-                <a:latin typeface="Segoe UI" panose="020B0502040204020203" pitchFamily="34" charset="0"/>
-                <a:ea typeface="Segoe UI" panose="020B0502040204020203" pitchFamily="34" charset="0"/>
-                <a:cs typeface="Segoe UI" panose="020B0502040204020203" pitchFamily="34" charset="0"/>
-              </a:rPr>
-              <a:t>Initial password:</a:t>
-            </a:r>
-            <a:r>
-              <a:rPr lang="ja-JP" altLang="en-US" dirty="0">
-                <a:solidFill>
-                  <a:srgbClr val="000000"/>
-                </a:solidFill>
-                <a:ea typeface="Segoe UI" panose="020B0502040204020203" pitchFamily="34" charset="0"/>
-              </a:rPr>
-              <a:t> </a:t>
-            </a:r>
-            <a:r>
-              <a:rPr lang="en-US" altLang="ja-JP" dirty="0">
-                <a:latin typeface="Segoe UI" panose="020B0502040204020203" pitchFamily="34" charset="0"/>
-                <a:ea typeface="Segoe UI" panose="020B0502040204020203" pitchFamily="34" charset="0"/>
-                <a:cs typeface="Segoe UI" panose="020B0502040204020203" pitchFamily="34" charset="0"/>
-              </a:rPr>
+              <a:rPr lang="ja-JP" altLang="ja-JP" dirty="0"/>
+              <a:t>　　・</a:t>
+            </a:r>
+            <a:r>
+              <a:rPr lang="en-US" altLang="ja-JP" dirty="0"/>
+              <a:t>Initial password</a:t>
+            </a:r>
+            <a:r>
+              <a:rPr lang="ja-JP" altLang="ja-JP" dirty="0"/>
+              <a:t> ： </a:t>
+            </a:r>
+            <a:r>
+              <a:rPr lang="en-US" altLang="ja-JP" dirty="0"/>
               <a:t>password</a:t>
             </a:r>
           </a:p>
@@ -24865,24 +25055,18 @@
           <a:p>
             <a:pPr lvl="1"/>
             <a:r>
-              <a:rPr lang="en-US" altLang="ja-JP" dirty="0"/>
-              <a:t>C</a:t>
-            </a:r>
-            <a:r>
               <a:rPr lang="en-US" altLang="ja-JP" dirty="0">
-                <a:latin typeface="Segoe UI" panose="020B0502040204020203" pitchFamily="34" charset="0"/>
-                <a:ea typeface="Segoe UI" panose="020B0502040204020203" pitchFamily="34" charset="0"/>
-                <a:cs typeface="Segoe UI" panose="020B0502040204020203" pitchFamily="34" charset="0"/>
-              </a:rPr>
-              <a:t>hange the initial password</a:t>
-            </a:r>
-            <a:r>
-              <a:rPr lang="en-US" altLang="ja-JP" dirty="0" smtClean="0">
-                <a:latin typeface="Segoe UI" panose="020B0502040204020203" pitchFamily="34" charset="0"/>
-                <a:ea typeface="Segoe UI" panose="020B0502040204020203" pitchFamily="34" charset="0"/>
-                <a:cs typeface="Segoe UI" panose="020B0502040204020203" pitchFamily="34" charset="0"/>
-              </a:rPr>
-              <a:t>.</a:t>
+                <a:cs typeface="Segoe UI" panose="020B0502040204020203" pitchFamily="34" charset="0"/>
+              </a:rPr>
+              <a:t>Please c</a:t>
+            </a:r>
+            <a:r>
+              <a:rPr lang="en-US" altLang="ja-JP" dirty="0">
+                <a:latin typeface="Segoe UI" panose="020B0502040204020203" pitchFamily="34" charset="0"/>
+                <a:ea typeface="Segoe UI" panose="020B0502040204020203" pitchFamily="34" charset="0"/>
+                <a:cs typeface="Segoe UI" panose="020B0502040204020203" pitchFamily="34" charset="0"/>
+              </a:rPr>
+              <a:t>hange the initial password.</a:t>
             </a:r>
             <a:endParaRPr lang="ja-JP" altLang="ja-JP" dirty="0">
               <a:latin typeface="Segoe UI" panose="020B0502040204020203" pitchFamily="34" charset="0"/>
@@ -24976,6 +25160,40 @@
           <a:chExt cx="0" cy="0"/>
         </a:xfrm>
       </p:grpSpPr>
+      <p:sp>
+        <p:nvSpPr>
+          <p:cNvPr id="3" name="コンテンツ プレースホルダー 2"/>
+          <p:cNvSpPr>
+            <a:spLocks noGrp="1"/>
+          </p:cNvSpPr>
+          <p:nvPr>
+            <p:ph sz="quarter" idx="10"/>
+          </p:nvPr>
+        </p:nvSpPr>
+        <p:spPr/>
+        <p:txBody>
+          <a:bodyPr/>
+          <a:lstStyle/>
+          <a:p>
+            <a:r>
+              <a:rPr lang="en-US" altLang="ja-JP" dirty="0" smtClean="0"/>
+              <a:t>IT Automation</a:t>
+            </a:r>
+            <a:r>
+              <a:rPr kumimoji="1" lang="en-US" altLang="ja-JP" dirty="0" smtClean="0"/>
+              <a:t> login screen</a:t>
+            </a:r>
+          </a:p>
+          <a:p>
+            <a:pPr lvl="1"/>
+            <a:r>
+              <a:rPr lang="en-US" altLang="ja-JP" dirty="0" smtClean="0"/>
+              <a:t>Having been successfully installed, IT Automation displays the following login screen:</a:t>
+            </a:r>
+            <a:endParaRPr kumimoji="1" lang="ja-JP" altLang="en-US" dirty="0"/>
+          </a:p>
+        </p:txBody>
+      </p:sp>
       <p:pic>
         <p:nvPicPr>
           <p:cNvPr id="4" name="図 3"/>
@@ -25039,40 +25257,6 @@
               <a:latin typeface="Segoe UI" panose="020B0502040204020203" pitchFamily="34" charset="0"/>
               <a:cs typeface="Segoe UI" panose="020B0502040204020203" pitchFamily="34" charset="0"/>
             </a:endParaRPr>
-          </a:p>
-        </p:txBody>
-      </p:sp>
-      <p:sp>
-        <p:nvSpPr>
-          <p:cNvPr id="3" name="コンテンツ プレースホルダー 2"/>
-          <p:cNvSpPr>
-            <a:spLocks noGrp="1"/>
-          </p:cNvSpPr>
-          <p:nvPr>
-            <p:ph sz="quarter" idx="10"/>
-          </p:nvPr>
-        </p:nvSpPr>
-        <p:spPr/>
-        <p:txBody>
-          <a:bodyPr/>
-          <a:lstStyle/>
-          <a:p>
-            <a:r>
-              <a:rPr lang="en-US" altLang="ja-JP" dirty="0" smtClean="0"/>
-              <a:t>IT Automation</a:t>
-            </a:r>
-            <a:r>
-              <a:rPr kumimoji="1" lang="en-US" altLang="ja-JP" dirty="0" smtClean="0"/>
-              <a:t> login screen</a:t>
-            </a:r>
-          </a:p>
-          <a:p>
-            <a:pPr lvl="1"/>
-            <a:r>
-              <a:rPr lang="en-US" altLang="ja-JP" dirty="0" smtClean="0"/>
-              <a:t>Having been successfully installed, IT Automation displays the following login screen:</a:t>
-            </a:r>
-            <a:endParaRPr kumimoji="1" lang="ja-JP" altLang="en-US" dirty="0"/>
           </a:p>
         </p:txBody>
       </p:sp>
@@ -26626,8 +26810,21 @@
                 <a:ea typeface="Segoe UI" panose="020B0502040204020203" pitchFamily="34" charset="0"/>
                 <a:cs typeface="Segoe UI" panose="020B0502040204020203" pitchFamily="34" charset="0"/>
               </a:rPr>
-              <a:t>For Windows 10, the hosts file is located at the following:</a:t>
-            </a:r>
+              <a:t>For Windows 10, the hosts file is located at the </a:t>
+            </a:r>
+            <a:r>
+              <a:rPr lang="en-US" altLang="ja-JP" dirty="0" smtClean="0">
+                <a:latin typeface="Segoe UI" panose="020B0502040204020203" pitchFamily="34" charset="0"/>
+                <a:ea typeface="Segoe UI" panose="020B0502040204020203" pitchFamily="34" charset="0"/>
+                <a:cs typeface="Segoe UI" panose="020B0502040204020203" pitchFamily="34" charset="0"/>
+              </a:rPr>
+              <a:t>following path:</a:t>
+            </a:r>
+            <a:endParaRPr lang="en-US" altLang="ja-JP" dirty="0" smtClean="0">
+              <a:latin typeface="Segoe UI" panose="020B0502040204020203" pitchFamily="34" charset="0"/>
+              <a:ea typeface="Segoe UI" panose="020B0502040204020203" pitchFamily="34" charset="0"/>
+              <a:cs typeface="Segoe UI" panose="020B0502040204020203" pitchFamily="34" charset="0"/>
+            </a:endParaRPr>
           </a:p>
           <a:p>
             <a:pPr lvl="1"/>
@@ -26675,7 +26872,31 @@
                 <a:ea typeface="Segoe UI" panose="020B0502040204020203" pitchFamily="34" charset="0"/>
                 <a:cs typeface="Segoe UI" panose="020B0502040204020203" pitchFamily="34" charset="0"/>
               </a:rPr>
-              <a:t>To the hosts file, add the following settings:</a:t>
+              <a:t>Add </a:t>
+            </a:r>
+            <a:r>
+              <a:rPr lang="en-US" altLang="ja-JP" dirty="0" smtClean="0">
+                <a:latin typeface="Segoe UI" panose="020B0502040204020203" pitchFamily="34" charset="0"/>
+                <a:ea typeface="Segoe UI" panose="020B0502040204020203" pitchFamily="34" charset="0"/>
+                <a:cs typeface="Segoe UI" panose="020B0502040204020203" pitchFamily="34" charset="0"/>
+              </a:rPr>
+              <a:t>the </a:t>
+            </a:r>
+            <a:r>
+              <a:rPr lang="en-US" altLang="ja-JP" dirty="0" smtClean="0">
+                <a:latin typeface="Segoe UI" panose="020B0502040204020203" pitchFamily="34" charset="0"/>
+                <a:ea typeface="Segoe UI" panose="020B0502040204020203" pitchFamily="34" charset="0"/>
+                <a:cs typeface="Segoe UI" panose="020B0502040204020203" pitchFamily="34" charset="0"/>
+              </a:rPr>
+              <a:t>following </a:t>
+            </a:r>
+            <a:r>
+              <a:rPr lang="en-US" altLang="ja-JP" dirty="0" smtClean="0">
+                <a:latin typeface="Segoe UI" panose="020B0502040204020203" pitchFamily="34" charset="0"/>
+                <a:ea typeface="Segoe UI" panose="020B0502040204020203" pitchFamily="34" charset="0"/>
+                <a:cs typeface="Segoe UI" panose="020B0502040204020203" pitchFamily="34" charset="0"/>
+              </a:rPr>
+              <a:t>settings to host file:</a:t>
             </a:r>
             <a:endParaRPr lang="ja-JP" altLang="en-US" dirty="0">
               <a:latin typeface="Segoe UI" panose="020B0502040204020203" pitchFamily="34" charset="0"/>
@@ -26774,7 +26995,7 @@
           <p:nvPr>
             <p:extLst>
               <p:ext uri="{D42A27DB-BD31-4B8C-83A1-F6EECF244321}">
-                <p14:modId xmlns:p14="http://schemas.microsoft.com/office/powerpoint/2010/main" val="2262637613"/>
+                <p14:modId xmlns:p14="http://schemas.microsoft.com/office/powerpoint/2010/main" val="2287069193"/>
               </p:ext>
             </p:extLst>
           </p:nvPr>
@@ -26813,34 +27034,22 @@
                         <a:rPr lang="en-US" sz="1050" kern="100" dirty="0" smtClean="0">
                           <a:effectLst/>
                         </a:rPr>
-                        <a:t>“ITA</a:t>
-                      </a:r>
-                      <a:r>
-                        <a:rPr lang="ja-JP" sz="1050" kern="100" dirty="0" smtClean="0">
-                          <a:effectLst/>
-                        </a:rPr>
-                        <a:t>実装</a:t>
-                      </a:r>
-                      <a:r>
-                        <a:rPr lang="ja-JP" sz="1050" kern="100" dirty="0">
-                          <a:effectLst/>
-                        </a:rPr>
-                        <a:t>サーバの</a:t>
-                      </a:r>
-                      <a:r>
-                        <a:rPr lang="en-US" sz="1050" kern="100" dirty="0">
-                          <a:effectLst/>
-                        </a:rPr>
-                        <a:t>IP</a:t>
-                      </a:r>
-                      <a:r>
-                        <a:rPr lang="ja-JP" sz="1050" kern="100" dirty="0">
-                          <a:effectLst/>
-                        </a:rPr>
-                        <a:t>アドレス</a:t>
-                      </a:r>
-                      <a:r>
-                        <a:rPr lang="en-US" sz="1050" kern="100" dirty="0">
+                        <a:t>“</a:t>
+                      </a:r>
+                      <a:r>
+                        <a:rPr lang="en-US" altLang="ja-JP" sz="1050" kern="100" dirty="0" smtClean="0">
+                          <a:effectLst/>
+                        </a:rPr>
+                        <a:t>IP address</a:t>
+                      </a:r>
+                      <a:r>
+                        <a:rPr lang="en-US" altLang="ja-JP" sz="1050" kern="100" baseline="0" dirty="0" smtClean="0">
+                          <a:effectLst/>
+                        </a:rPr>
+                        <a:t> of ITA server</a:t>
+                      </a:r>
+                      <a:r>
+                        <a:rPr lang="en-US" sz="1050" kern="100" dirty="0" smtClean="0">
                           <a:effectLst/>
                         </a:rPr>
                         <a:t>”</a:t>
@@ -26892,10 +27101,10 @@
                         </a:rPr>
                       </a:br>
                       <a:r>
-                        <a:rPr lang="ja-JP" sz="1050" kern="0" dirty="0" smtClean="0">
-                          <a:effectLst/>
-                        </a:rPr>
-                        <a:t>例</a:t>
+                        <a:rPr lang="en-US" altLang="ja-JP" sz="1050" kern="0" dirty="0" smtClean="0">
+                          <a:effectLst/>
+                        </a:rPr>
+                        <a:t>e.g.</a:t>
                       </a:r>
                       <a:r>
                         <a:rPr lang="ja-JP" altLang="en-US" sz="1050" kern="0" dirty="0" smtClean="0">
@@ -27113,7 +27322,23 @@
                 <a:ea typeface="Segoe UI" panose="020B0502040204020203" pitchFamily="34" charset="0"/>
                 <a:cs typeface="Segoe UI" panose="020B0502040204020203" pitchFamily="34" charset="0"/>
               </a:rPr>
-              <a:t>Use a tool (such as FFFTP and WinSCP) to download the client.</a:t>
+              <a:t>Use a tool (such as FFFTP and WinSCP) to download </a:t>
+            </a:r>
+            <a:r>
+              <a:rPr lang="en-US" altLang="ja-JP" dirty="0" smtClean="0">
+                <a:latin typeface="Segoe UI" panose="020B0502040204020203" pitchFamily="34" charset="0"/>
+                <a:ea typeface="Segoe UI" panose="020B0502040204020203" pitchFamily="34" charset="0"/>
+                <a:cs typeface="Segoe UI" panose="020B0502040204020203" pitchFamily="34" charset="0"/>
+              </a:rPr>
+              <a:t>to the </a:t>
+            </a:r>
+            <a:r>
+              <a:rPr lang="en-US" altLang="ja-JP" dirty="0" smtClean="0">
+                <a:latin typeface="Segoe UI" panose="020B0502040204020203" pitchFamily="34" charset="0"/>
+                <a:ea typeface="Segoe UI" panose="020B0502040204020203" pitchFamily="34" charset="0"/>
+                <a:cs typeface="Segoe UI" panose="020B0502040204020203" pitchFamily="34" charset="0"/>
+              </a:rPr>
+              <a:t>client.</a:t>
             </a:r>
             <a:endParaRPr lang="ja-JP" altLang="ja-JP" dirty="0">
               <a:latin typeface="Segoe UI" panose="020B0502040204020203" pitchFamily="34" charset="0"/>
@@ -28514,12 +28739,12 @@
               <a:t>Please perform the following procedure to </a:t>
             </a:r>
             <a:r>
-              <a:rPr lang="en-US" altLang="ja-JP" dirty="0" err="1"/>
-              <a:t>resctrict</a:t>
+              <a:rPr lang="en-US" altLang="ja-JP" dirty="0" smtClean="0"/>
+              <a:t>restrict </a:t>
             </a:r>
             <a:r>
               <a:rPr lang="en-US" altLang="ja-JP" dirty="0"/>
-              <a:t> HTTP or HTTPS access</a:t>
+              <a:t>HTTP or HTTPS access</a:t>
             </a:r>
             <a:r>
               <a:rPr lang="en-US" altLang="ja-JP" dirty="0" smtClean="0"/>
@@ -28943,7 +29168,15 @@
                 <a:ea typeface="Segoe UI" panose="020B0502040204020203" pitchFamily="34" charset="0"/>
                 <a:cs typeface="Segoe UI" panose="020B0502040204020203" pitchFamily="34" charset="0"/>
               </a:rPr>
-              <a:t>	About This Guide</a:t>
+              <a:t>	About </a:t>
+            </a:r>
+            <a:r>
+              <a:rPr lang="en-US" altLang="ja-JP" dirty="0" smtClean="0">
+                <a:latin typeface="Segoe UI" panose="020B0502040204020203" pitchFamily="34" charset="0"/>
+                <a:ea typeface="Segoe UI" panose="020B0502040204020203" pitchFamily="34" charset="0"/>
+                <a:cs typeface="Segoe UI" panose="020B0502040204020203" pitchFamily="34" charset="0"/>
+              </a:rPr>
+              <a:t>This Guide</a:t>
             </a:r>
             <a:endParaRPr kumimoji="1" lang="ja-JP" altLang="en-US" dirty="0">
               <a:latin typeface="Segoe UI" panose="020B0502040204020203" pitchFamily="34" charset="0"/>
@@ -29094,7 +29327,15 @@
                 <a:ea typeface="Segoe UI" panose="020B0502040204020203" pitchFamily="34" charset="0"/>
                 <a:cs typeface="Segoe UI" panose="020B0502040204020203" pitchFamily="34" charset="0"/>
               </a:rPr>
-              <a:t>System Organization</a:t>
+              <a:t>System </a:t>
+            </a:r>
+            <a:r>
+              <a:rPr lang="en-US" altLang="ja-JP" dirty="0" smtClean="0">
+                <a:latin typeface="Segoe UI" panose="020B0502040204020203" pitchFamily="34" charset="0"/>
+                <a:ea typeface="Segoe UI" panose="020B0502040204020203" pitchFamily="34" charset="0"/>
+                <a:cs typeface="Segoe UI" panose="020B0502040204020203" pitchFamily="34" charset="0"/>
+              </a:rPr>
+              <a:t>Configuration</a:t>
             </a:r>
             <a:endParaRPr kumimoji="1" lang="ja-JP" altLang="en-US" dirty="0">
               <a:latin typeface="Segoe UI" panose="020B0502040204020203" pitchFamily="34" charset="0"/>
@@ -29166,16 +29407,8 @@
               <a:t>2.1	</a:t>
             </a:r>
             <a:r>
-              <a:rPr lang="en-US" altLang="zh-TW" dirty="0">
-                <a:ea typeface="Segoe UI" panose="020B0502040204020203" pitchFamily="34" charset="0"/>
-              </a:rPr>
-              <a:t>Functions executed in conjunction with other </a:t>
-            </a:r>
-            <a:r>
-              <a:rPr lang="en-US" altLang="zh-TW" dirty="0" smtClean="0">
-                <a:ea typeface="Segoe UI" panose="020B0502040204020203" pitchFamily="34" charset="0"/>
-              </a:rPr>
-              <a:t>tools</a:t>
+              <a:rPr lang="en-US" altLang="zh-TW" dirty="0"/>
+              <a:t> Associated execution function</a:t>
             </a:r>
             <a:endParaRPr lang="zh-TW" altLang="en-US" dirty="0">
               <a:latin typeface="Segoe UI" panose="020B0502040204020203" pitchFamily="34" charset="0"/>
@@ -29205,18 +29438,8 @@
           <a:lstStyle/>
           <a:p>
             <a:r>
-              <a:rPr lang="en-US" altLang="zh-TW" dirty="0" smtClean="0">
-                <a:ea typeface="Segoe UI" panose="020B0502040204020203" pitchFamily="34" charset="0"/>
-              </a:rPr>
-              <a:t>Functions executed </a:t>
-            </a:r>
-            <a:r>
-              <a:rPr lang="en-US" altLang="zh-TW" dirty="0" smtClean="0">
-                <a:latin typeface="Segoe UI" panose="020B0502040204020203" pitchFamily="34" charset="0"/>
-                <a:ea typeface="Segoe UI" panose="020B0502040204020203" pitchFamily="34" charset="0"/>
-                <a:cs typeface="Segoe UI" panose="020B0502040204020203" pitchFamily="34" charset="0"/>
-              </a:rPr>
-              <a:t>in conjunction with other tools</a:t>
+              <a:rPr lang="en-US" altLang="zh-TW" dirty="0"/>
+              <a:t>About associated execution function</a:t>
             </a:r>
           </a:p>
           <a:p>
@@ -29229,6 +29452,11 @@
               </a:rPr>
               <a:t>IT Automation supports the tools for the following functions:</a:t>
             </a:r>
+            <a:endParaRPr lang="en-US" altLang="ja-JP" dirty="0" smtClean="0">
+              <a:latin typeface="Segoe UI" panose="020B0502040204020203" pitchFamily="34" charset="0"/>
+              <a:ea typeface="Segoe UI" panose="020B0502040204020203" pitchFamily="34" charset="0"/>
+              <a:cs typeface="Segoe UI" panose="020B0502040204020203" pitchFamily="34" charset="0"/>
+            </a:endParaRPr>
           </a:p>
         </p:txBody>
       </p:sp>
@@ -31942,7 +32170,23 @@
                 <a:ea typeface="Segoe UI" panose="020B0502040204020203" pitchFamily="34" charset="0"/>
                 <a:cs typeface="Segoe UI" panose="020B0502040204020203" pitchFamily="34" charset="0"/>
               </a:rPr>
-              <a:t>IT Automation Configuration Procedure</a:t>
+              <a:t>IT Automation </a:t>
+            </a:r>
+            <a:r>
+              <a:rPr lang="en-US" altLang="ja-JP" dirty="0" smtClean="0">
+                <a:latin typeface="Segoe UI" panose="020B0502040204020203" pitchFamily="34" charset="0"/>
+                <a:ea typeface="Segoe UI" panose="020B0502040204020203" pitchFamily="34" charset="0"/>
+                <a:cs typeface="Segoe UI" panose="020B0502040204020203" pitchFamily="34" charset="0"/>
+              </a:rPr>
+              <a:t>Construction </a:t>
+            </a:r>
+            <a:r>
+              <a:rPr lang="en-US" altLang="ja-JP" dirty="0" smtClean="0">
+                <a:latin typeface="Segoe UI" panose="020B0502040204020203" pitchFamily="34" charset="0"/>
+                <a:ea typeface="Segoe UI" panose="020B0502040204020203" pitchFamily="34" charset="0"/>
+                <a:cs typeface="Segoe UI" panose="020B0502040204020203" pitchFamily="34" charset="0"/>
+              </a:rPr>
+              <a:t>Procedure</a:t>
             </a:r>
             <a:endParaRPr kumimoji="1" lang="ja-JP" altLang="en-US" dirty="0">
               <a:latin typeface="Segoe UI" panose="020B0502040204020203" pitchFamily="34" charset="0"/>

</xml_diff>